<commit_message>
Update expense model, vectorizer, and transaction data with new training datasets, and add a project presentation.
</commit_message>
<xml_diff>
--- a/Reports&ppts/PBL.pptx
+++ b/Reports&ppts/PBL.pptx
@@ -5,7 +5,7 @@
     <p:sldMasterId id="2147483648" r:id="rId1"/>
   </p:sldMasterIdLst>
   <p:notesMasterIdLst>
-    <p:notesMasterId r:id="rId17"/>
+    <p:notesMasterId r:id="rId18"/>
   </p:notesMasterIdLst>
   <p:sldIdLst>
     <p:sldId id="267" r:id="rId2"/>
@@ -15,14 +15,15 @@
     <p:sldId id="260" r:id="rId6"/>
     <p:sldId id="268" r:id="rId7"/>
     <p:sldId id="261" r:id="rId8"/>
-    <p:sldId id="262" r:id="rId9"/>
-    <p:sldId id="272" r:id="rId10"/>
-    <p:sldId id="269" r:id="rId11"/>
-    <p:sldId id="270" r:id="rId12"/>
-    <p:sldId id="271" r:id="rId13"/>
-    <p:sldId id="273" r:id="rId14"/>
-    <p:sldId id="274" r:id="rId15"/>
-    <p:sldId id="266" r:id="rId16"/>
+    <p:sldId id="275" r:id="rId9"/>
+    <p:sldId id="262" r:id="rId10"/>
+    <p:sldId id="272" r:id="rId11"/>
+    <p:sldId id="269" r:id="rId12"/>
+    <p:sldId id="270" r:id="rId13"/>
+    <p:sldId id="271" r:id="rId14"/>
+    <p:sldId id="273" r:id="rId15"/>
+    <p:sldId id="274" r:id="rId16"/>
+    <p:sldId id="266" r:id="rId17"/>
   </p:sldIdLst>
   <p:sldSz cx="12188825" cy="6858000"/>
   <p:notesSz cx="7772400" cy="10058400"/>
@@ -500,6 +501,69 @@
   <p:cSld>
     <p:spTree>
       <p:nvGrpSpPr>
+        <p:cNvPr id="1" name="">
+          <a:extLst>
+            <a:ext uri="{FF2B5EF4-FFF2-40B4-BE49-F238E27FC236}">
+              <a16:creationId xmlns:a16="http://schemas.microsoft.com/office/drawing/2014/main" id="{671B262C-5EAA-92F1-A89B-BDF6636C691F}"/>
+            </a:ext>
+          </a:extLst>
+        </p:cNvPr>
+        <p:cNvGrpSpPr/>
+        <p:nvPr/>
+      </p:nvGrpSpPr>
+      <p:grpSpPr>
+        <a:xfrm>
+          <a:off x="0" y="0"/>
+          <a:ext cx="0" cy="0"/>
+          <a:chOff x="0" y="0"/>
+          <a:chExt cx="0" cy="0"/>
+        </a:xfrm>
+      </p:grpSpPr>
+      <p:sp>
+        <p:nvSpPr>
+          <p:cNvPr id="2" name="Notes Placeholder">
+            <a:extLst>
+              <a:ext uri="{FF2B5EF4-FFF2-40B4-BE49-F238E27FC236}">
+                <a16:creationId xmlns:a16="http://schemas.microsoft.com/office/drawing/2014/main" id="{FD44462A-AC9A-8DB7-483D-B1A7CE207181}"/>
+              </a:ext>
+            </a:extLst>
+          </p:cNvPr>
+          <p:cNvSpPr>
+            <a:spLocks noGrp="1"/>
+          </p:cNvSpPr>
+          <p:nvPr>
+            <p:ph type="body" idx="1"/>
+          </p:nvPr>
+        </p:nvSpPr>
+        <p:spPr/>
+        <p:txBody>
+          <a:bodyPr>
+            <a:normAutofit fontScale="25000" lnSpcReduction="20000"/>
+          </a:bodyPr>
+          <a:lstStyle/>
+          <a:p>
+            <a:endParaRPr/>
+          </a:p>
+        </p:txBody>
+      </p:sp>
+    </p:spTree>
+    <p:extLst>
+      <p:ext uri="{BB962C8B-B14F-4D97-AF65-F5344CB8AC3E}">
+        <p14:creationId xmlns:p14="http://schemas.microsoft.com/office/powerpoint/2010/main" val="1582538007"/>
+      </p:ext>
+    </p:extLst>
+  </p:cSld>
+  <p:clrMapOvr>
+    <a:masterClrMapping/>
+  </p:clrMapOvr>
+</p:notes>
+</file>
+
+<file path=ppt/notesSlides/notesSlide7.xml><?xml version="1.0" encoding="utf-8"?>
+<p:notes xmlns:a="http://schemas.openxmlformats.org/drawingml/2006/main" xmlns:r="http://schemas.openxmlformats.org/officeDocument/2006/relationships" xmlns:p="http://schemas.openxmlformats.org/presentationml/2006/main">
+  <p:cSld>
+    <p:spTree>
+      <p:nvGrpSpPr>
         <p:cNvPr id="1" name=""/>
         <p:cNvGrpSpPr/>
         <p:nvPr/>
@@ -541,7 +605,7 @@
 </p:notes>
 </file>
 
-<file path=ppt/notesSlides/notesSlide7.xml><?xml version="1.0" encoding="utf-8"?>
+<file path=ppt/notesSlides/notesSlide8.xml><?xml version="1.0" encoding="utf-8"?>
 <p:notes xmlns:a="http://schemas.openxmlformats.org/drawingml/2006/main" xmlns:r="http://schemas.openxmlformats.org/officeDocument/2006/relationships" xmlns:p="http://schemas.openxmlformats.org/presentationml/2006/main">
   <p:cSld>
     <p:spTree>
@@ -726,7 +790,7 @@
           <a:p>
             <a:fld id="{1D8BD707-D9CF-40AE-B4C6-C98DA3205C09}" type="datetimeFigureOut">
               <a:rPr lang="en-US"/>
-              <a:t>11/19/2025</a:t>
+              <a:t>2/26/2026</a:t>
             </a:fld>
             <a:endParaRPr lang="en-US"/>
           </a:p>
@@ -1011,7 +1075,7 @@
           <a:p>
             <a:fld id="{1D8BD707-D9CF-40AE-B4C6-C98DA3205C09}" type="datetimeFigureOut">
               <a:rPr lang="en-US"/>
-              <a:t>11/19/2025</a:t>
+              <a:t>2/26/2026</a:t>
             </a:fld>
             <a:endParaRPr lang="en-US"/>
           </a:p>
@@ -1225,7 +1289,7 @@
           <a:p>
             <a:fld id="{1D8BD707-D9CF-40AE-B4C6-C98DA3205C09}" type="datetimeFigureOut">
               <a:rPr lang="en-US"/>
-              <a:t>11/19/2025</a:t>
+              <a:t>2/26/2026</a:t>
             </a:fld>
             <a:endParaRPr lang="en-US"/>
           </a:p>
@@ -1373,7 +1437,7 @@
           <a:p>
             <a:fld id="{1D8BD707-D9CF-40AE-B4C6-C98DA3205C09}" type="datetimeFigureOut">
               <a:rPr lang="en-US"/>
-              <a:t>11/19/2025</a:t>
+              <a:t>2/26/2026</a:t>
             </a:fld>
             <a:endParaRPr lang="en-US"/>
           </a:p>
@@ -1492,7 +1556,7 @@
           <a:p>
             <a:fld id="{1D8BD707-D9CF-40AE-B4C6-C98DA3205C09}" type="datetimeFigureOut">
               <a:rPr lang="en-US"/>
-              <a:t>11/19/2025</a:t>
+              <a:t>2/26/2026</a:t>
             </a:fld>
             <a:endParaRPr lang="en-US"/>
           </a:p>
@@ -1717,7 +1781,7 @@
           <a:p>
             <a:fld id="{1D8BD707-D9CF-40AE-B4C6-C98DA3205C09}" type="datetimeFigureOut">
               <a:rPr lang="en-US"/>
-              <a:t>11/19/2025</a:t>
+              <a:t>2/26/2026</a:t>
             </a:fld>
             <a:endParaRPr lang="en-US"/>
           </a:p>
@@ -2462,6 +2526,72 @@
       </p:grpSpPr>
       <p:pic>
         <p:nvPicPr>
+          <p:cNvPr id="3" name="Picture 2" descr="A screen shot of a computer&#10;&#10;AI-generated content may be incorrect.">
+            <a:extLst>
+              <a:ext uri="{FF2B5EF4-FFF2-40B4-BE49-F238E27FC236}">
+                <a16:creationId xmlns:a16="http://schemas.microsoft.com/office/drawing/2014/main" id="{A34A5C96-B8CB-9ED5-7FF6-F5577A1E8F99}"/>
+              </a:ext>
+            </a:extLst>
+          </p:cNvPr>
+          <p:cNvPicPr>
+            <a:picLocks noChangeAspect="1"/>
+          </p:cNvPicPr>
+          <p:nvPr/>
+        </p:nvPicPr>
+        <p:blipFill>
+          <a:blip r:embed="rId2">
+            <a:extLst>
+              <a:ext uri="{28A0092B-C50C-407E-A947-70E740481C1C}">
+                <a14:useLocalDpi xmlns:a14="http://schemas.microsoft.com/office/drawing/2010/main" val="0"/>
+              </a:ext>
+            </a:extLst>
+          </a:blip>
+          <a:stretch>
+            <a:fillRect/>
+          </a:stretch>
+        </p:blipFill>
+        <p:spPr>
+          <a:xfrm>
+            <a:off x="0" y="893"/>
+            <a:ext cx="12188825" cy="6856214"/>
+          </a:xfrm>
+          <a:prstGeom prst="rect">
+            <a:avLst/>
+          </a:prstGeom>
+        </p:spPr>
+      </p:pic>
+    </p:spTree>
+    <p:extLst>
+      <p:ext uri="{BB962C8B-B14F-4D97-AF65-F5344CB8AC3E}">
+        <p14:creationId xmlns:p14="http://schemas.microsoft.com/office/powerpoint/2010/main" val="1244062432"/>
+      </p:ext>
+    </p:extLst>
+  </p:cSld>
+  <p:clrMapOvr>
+    <a:masterClrMapping/>
+  </p:clrMapOvr>
+</p:sld>
+</file>
+
+<file path=ppt/slides/slide11.xml><?xml version="1.0" encoding="utf-8"?>
+<p:sld xmlns:a="http://schemas.openxmlformats.org/drawingml/2006/main" xmlns:r="http://schemas.openxmlformats.org/officeDocument/2006/relationships" xmlns:p="http://schemas.openxmlformats.org/presentationml/2006/main">
+  <p:cSld>
+    <p:spTree>
+      <p:nvGrpSpPr>
+        <p:cNvPr id="1" name=""/>
+        <p:cNvGrpSpPr/>
+        <p:nvPr/>
+      </p:nvGrpSpPr>
+      <p:grpSpPr>
+        <a:xfrm>
+          <a:off x="0" y="0"/>
+          <a:ext cx="0" cy="0"/>
+          <a:chOff x="0" y="0"/>
+          <a:chExt cx="0" cy="0"/>
+        </a:xfrm>
+      </p:grpSpPr>
+      <p:pic>
+        <p:nvPicPr>
           <p:cNvPr id="3" name="Picture 2" descr="A computer screen shot of a computer screen&#10;&#10;AI-generated content may be incorrect.">
             <a:extLst>
               <a:ext uri="{FF2B5EF4-FFF2-40B4-BE49-F238E27FC236}">
@@ -2509,7 +2639,7 @@
 </p:sld>
 </file>
 
-<file path=ppt/slides/slide11.xml><?xml version="1.0" encoding="utf-8"?>
+<file path=ppt/slides/slide12.xml><?xml version="1.0" encoding="utf-8"?>
 <p:sld xmlns:a="http://schemas.openxmlformats.org/drawingml/2006/main" xmlns:r="http://schemas.openxmlformats.org/officeDocument/2006/relationships" xmlns:p="http://schemas.openxmlformats.org/presentationml/2006/main">
   <p:cSld>
     <p:spTree>
@@ -2575,7 +2705,7 @@
 </p:sld>
 </file>
 
-<file path=ppt/slides/slide12.xml><?xml version="1.0" encoding="utf-8"?>
+<file path=ppt/slides/slide13.xml><?xml version="1.0" encoding="utf-8"?>
 <p:sld xmlns:a="http://schemas.openxmlformats.org/drawingml/2006/main" xmlns:r="http://schemas.openxmlformats.org/officeDocument/2006/relationships" xmlns:p="http://schemas.openxmlformats.org/presentationml/2006/main">
   <p:cSld>
     <p:spTree>
@@ -2641,7 +2771,7 @@
 </p:sld>
 </file>
 
-<file path=ppt/slides/slide13.xml><?xml version="1.0" encoding="utf-8"?>
+<file path=ppt/slides/slide14.xml><?xml version="1.0" encoding="utf-8"?>
 <p:sld xmlns:a="http://schemas.openxmlformats.org/drawingml/2006/main" xmlns:r="http://schemas.openxmlformats.org/officeDocument/2006/relationships" xmlns:p="http://schemas.openxmlformats.org/presentationml/2006/main">
   <p:cSld>
     <p:spTree>
@@ -2707,7 +2837,7 @@
 </p:sld>
 </file>
 
-<file path=ppt/slides/slide14.xml><?xml version="1.0" encoding="utf-8"?>
+<file path=ppt/slides/slide15.xml><?xml version="1.0" encoding="utf-8"?>
 <p:sld xmlns:a="http://schemas.openxmlformats.org/drawingml/2006/main" xmlns:r="http://schemas.openxmlformats.org/officeDocument/2006/relationships" xmlns:p="http://schemas.openxmlformats.org/presentationml/2006/main">
   <p:cSld>
     <p:spTree>
@@ -2773,7 +2903,7 @@
 </p:sld>
 </file>
 
-<file path=ppt/slides/slide15.xml><?xml version="1.0" encoding="utf-8"?>
+<file path=ppt/slides/slide16.xml><?xml version="1.0" encoding="utf-8"?>
 <p:sld xmlns:a="http://schemas.openxmlformats.org/drawingml/2006/main" xmlns:r="http://schemas.openxmlformats.org/officeDocument/2006/relationships" xmlns:p="http://schemas.openxmlformats.org/presentationml/2006/main" showMasterSp="0">
   <p:cSld>
     <p:spTree>
@@ -12985,7 +13115,7 @@
           <p:nvPr>
             <p:extLst>
               <p:ext uri="{D42A27DB-BD31-4B8C-83A1-F6EECF244321}">
-                <p14:modId xmlns:p14="http://schemas.microsoft.com/office/powerpoint/2010/main" val="2476820949"/>
+                <p14:modId xmlns:p14="http://schemas.microsoft.com/office/powerpoint/2010/main" val="593474529"/>
               </p:ext>
             </p:extLst>
           </p:nvPr>
@@ -16539,7 +16669,7 @@
                         </a:rPr>
                         <a:t>LocalFinTr acker</a:t>
                       </a:r>
-                      <a:endParaRPr sz="1100">
+                      <a:endParaRPr sz="1100" dirty="0">
                         <a:latin typeface="Arial"/>
                         <a:cs typeface="Arial"/>
                       </a:endParaRPr>
@@ -16773,9 +16903,29 @@
                           <a:latin typeface="Arial"/>
                           <a:cs typeface="Arial"/>
                         </a:rPr>
-                        <a:t>Private Automatic n</a:t>
+                        <a:t>Private </a:t>
                       </a:r>
-                      <a:endParaRPr sz="1100">
+                      <a:r>
+                        <a:rPr lang="en-US" sz="1100" b="1" dirty="0">
+                          <a:solidFill>
+                            <a:srgbClr val="1D1C1C"/>
+                          </a:solidFill>
+                          <a:latin typeface="Arial"/>
+                          <a:cs typeface="Arial"/>
+                        </a:rPr>
+                        <a:t>and </a:t>
+                      </a:r>
+                      <a:r>
+                        <a:rPr sz="1100" b="1" dirty="0">
+                          <a:solidFill>
+                            <a:srgbClr val="1D1C1C"/>
+                          </a:solidFill>
+                          <a:latin typeface="Arial"/>
+                          <a:cs typeface="Arial"/>
+                        </a:rPr>
+                        <a:t>Automatic </a:t>
+                      </a:r>
+                      <a:endParaRPr sz="1100" dirty="0">
                         <a:latin typeface="Arial"/>
                         <a:cs typeface="Arial"/>
                       </a:endParaRPr>
@@ -21742,7 +21892,7 @@
               </a:rPr>
               <a:t>capabilities:</a:t>
             </a:r>
-            <a:endParaRPr sz="1400" dirty="0">
+            <a:endParaRPr lang="en-US" sz="1400" dirty="0">
               <a:latin typeface="Arial"/>
               <a:cs typeface="Arial"/>
             </a:endParaRPr>
@@ -21765,47 +21915,7 @@
               </a:tabLst>
             </a:pPr>
             <a:r>
-              <a:rPr sz="1400" b="1" spc="-10" dirty="0">
-                <a:solidFill>
-                  <a:srgbClr val="1C1A1A"/>
-                </a:solidFill>
-                <a:latin typeface="Arial"/>
-                <a:cs typeface="Arial"/>
-              </a:rPr>
-              <a:t>Phase</a:t>
-            </a:r>
-            <a:r>
-              <a:rPr sz="1400" b="1" spc="-25" dirty="0">
-                <a:solidFill>
-                  <a:srgbClr val="1C1A1A"/>
-                </a:solidFill>
-                <a:latin typeface="Arial"/>
-                <a:cs typeface="Arial"/>
-              </a:rPr>
-              <a:t> </a:t>
-            </a:r>
-            <a:r>
-              <a:rPr sz="1400" b="1" spc="-60" dirty="0">
-                <a:solidFill>
-                  <a:srgbClr val="1C1A1A"/>
-                </a:solidFill>
-                <a:latin typeface="Arial"/>
-                <a:cs typeface="Arial"/>
-              </a:rPr>
-              <a:t>1:</a:t>
-            </a:r>
-            <a:r>
-              <a:rPr sz="1400" b="1" spc="-110" dirty="0">
-                <a:solidFill>
-                  <a:srgbClr val="1C1A1A"/>
-                </a:solidFill>
-                <a:latin typeface="Arial"/>
-                <a:cs typeface="Arial"/>
-              </a:rPr>
-              <a:t> </a:t>
-            </a:r>
-            <a:r>
-              <a:rPr sz="1400" b="1" spc="-35" dirty="0">
+              <a:rPr lang="en-US" sz="1400" b="1" spc="-35" dirty="0">
                 <a:solidFill>
                   <a:srgbClr val="1C1A1A"/>
                 </a:solidFill>
@@ -21815,17 +21925,17 @@
               <a:t>API</a:t>
             </a:r>
             <a:r>
-              <a:rPr sz="1400" b="1" spc="114" dirty="0">
-                <a:solidFill>
-                  <a:srgbClr val="1C1A1A"/>
-                </a:solidFill>
-                <a:latin typeface="Arial"/>
-                <a:cs typeface="Arial"/>
-              </a:rPr>
-              <a:t> </a:t>
-            </a:r>
-            <a:r>
-              <a:rPr sz="1400" b="1" spc="10" dirty="0">
+              <a:rPr lang="en-US" sz="1400" b="1" spc="114" dirty="0">
+                <a:solidFill>
+                  <a:srgbClr val="1C1A1A"/>
+                </a:solidFill>
+                <a:latin typeface="Arial"/>
+                <a:cs typeface="Arial"/>
+              </a:rPr>
+              <a:t> </a:t>
+            </a:r>
+            <a:r>
+              <a:rPr lang="en-US" sz="1400" b="1" spc="10" dirty="0">
                 <a:solidFill>
                   <a:srgbClr val="1C1A1A"/>
                 </a:solidFill>
@@ -21835,17 +21945,17 @@
               <a:t>Integration</a:t>
             </a:r>
             <a:r>
-              <a:rPr sz="1400" b="1" spc="120" dirty="0">
-                <a:solidFill>
-                  <a:srgbClr val="1C1A1A"/>
-                </a:solidFill>
-                <a:latin typeface="Arial"/>
-                <a:cs typeface="Arial"/>
-              </a:rPr>
-              <a:t> </a:t>
-            </a:r>
-            <a:r>
-              <a:rPr sz="1400" b="1" spc="5" dirty="0">
+              <a:rPr lang="en-US" sz="1400" b="1" spc="120" dirty="0">
+                <a:solidFill>
+                  <a:srgbClr val="1C1A1A"/>
+                </a:solidFill>
+                <a:latin typeface="Arial"/>
+                <a:cs typeface="Arial"/>
+              </a:rPr>
+              <a:t> </a:t>
+            </a:r>
+            <a:r>
+              <a:rPr lang="en-US" sz="1400" b="1" spc="5" dirty="0">
                 <a:solidFill>
                   <a:srgbClr val="1C1A1A"/>
                 </a:solidFill>
@@ -21855,17 +21965,17 @@
               <a:t>(Plaid):</a:t>
             </a:r>
             <a:r>
-              <a:rPr sz="1400" b="1" spc="35" dirty="0">
-                <a:solidFill>
-                  <a:srgbClr val="1C1A1A"/>
-                </a:solidFill>
-                <a:latin typeface="Arial"/>
-                <a:cs typeface="Arial"/>
-              </a:rPr>
-              <a:t> </a:t>
-            </a:r>
-            <a:r>
-              <a:rPr sz="1400" spc="-20" dirty="0">
+              <a:rPr lang="en-US" sz="1400" b="1" spc="35" dirty="0">
+                <a:solidFill>
+                  <a:srgbClr val="1C1A1A"/>
+                </a:solidFill>
+                <a:latin typeface="Arial"/>
+                <a:cs typeface="Arial"/>
+              </a:rPr>
+              <a:t> </a:t>
+            </a:r>
+            <a:r>
+              <a:rPr lang="en-US" sz="1400" spc="-20" dirty="0">
                 <a:solidFill>
                   <a:srgbClr val="1C1A1A"/>
                 </a:solidFill>
@@ -21875,17 +21985,17 @@
               <a:t>Replace</a:t>
             </a:r>
             <a:r>
-              <a:rPr sz="1400" spc="30" dirty="0">
-                <a:solidFill>
-                  <a:srgbClr val="1C1A1A"/>
-                </a:solidFill>
-                <a:latin typeface="Arial"/>
-                <a:cs typeface="Arial"/>
-              </a:rPr>
-              <a:t> </a:t>
-            </a:r>
-            <a:r>
-              <a:rPr sz="1400" spc="-10" dirty="0">
+              <a:rPr lang="en-US" sz="1400" spc="30" dirty="0">
+                <a:solidFill>
+                  <a:srgbClr val="1C1A1A"/>
+                </a:solidFill>
+                <a:latin typeface="Arial"/>
+                <a:cs typeface="Arial"/>
+              </a:rPr>
+              <a:t> </a:t>
+            </a:r>
+            <a:r>
+              <a:rPr lang="en-US" sz="1400" spc="-10" dirty="0">
                 <a:solidFill>
                   <a:srgbClr val="1C1A1A"/>
                 </a:solidFill>
@@ -21895,17 +22005,17 @@
               <a:t>manual</a:t>
             </a:r>
             <a:r>
-              <a:rPr sz="1400" spc="20" dirty="0">
-                <a:solidFill>
-                  <a:srgbClr val="1C1A1A"/>
-                </a:solidFill>
-                <a:latin typeface="Arial"/>
-                <a:cs typeface="Arial"/>
-              </a:rPr>
-              <a:t> </a:t>
-            </a:r>
-            <a:r>
-              <a:rPr sz="1400" spc="-85" dirty="0">
+              <a:rPr lang="en-US" sz="1400" spc="20" dirty="0">
+                <a:solidFill>
+                  <a:srgbClr val="1C1A1A"/>
+                </a:solidFill>
+                <a:latin typeface="Arial"/>
+                <a:cs typeface="Arial"/>
+              </a:rPr>
+              <a:t> </a:t>
+            </a:r>
+            <a:r>
+              <a:rPr lang="en-US" sz="1400" spc="-85" dirty="0">
                 <a:solidFill>
                   <a:srgbClr val="1C1A1A"/>
                 </a:solidFill>
@@ -21915,17 +22025,17 @@
               <a:t>CSV</a:t>
             </a:r>
             <a:r>
-              <a:rPr sz="1400" spc="35" dirty="0">
-                <a:solidFill>
-                  <a:srgbClr val="1C1A1A"/>
-                </a:solidFill>
-                <a:latin typeface="Arial"/>
-                <a:cs typeface="Arial"/>
-              </a:rPr>
-              <a:t> </a:t>
-            </a:r>
-            <a:r>
-              <a:rPr sz="1400" spc="5" dirty="0">
+              <a:rPr lang="en-US" sz="1400" spc="35" dirty="0">
+                <a:solidFill>
+                  <a:srgbClr val="1C1A1A"/>
+                </a:solidFill>
+                <a:latin typeface="Arial"/>
+                <a:cs typeface="Arial"/>
+              </a:rPr>
+              <a:t> </a:t>
+            </a:r>
+            <a:r>
+              <a:rPr lang="en-US" sz="1400" spc="5" dirty="0">
                 <a:solidFill>
                   <a:srgbClr val="1C1A1A"/>
                 </a:solidFill>
@@ -21935,17 +22045,17 @@
               <a:t>downloads</a:t>
             </a:r>
             <a:r>
-              <a:rPr sz="1400" spc="60" dirty="0">
-                <a:solidFill>
-                  <a:srgbClr val="1C1A1A"/>
-                </a:solidFill>
-                <a:latin typeface="Arial"/>
-                <a:cs typeface="Arial"/>
-              </a:rPr>
-              <a:t> </a:t>
-            </a:r>
-            <a:r>
-              <a:rPr sz="1400" spc="15" dirty="0">
+              <a:rPr lang="en-US" sz="1400" spc="60" dirty="0">
+                <a:solidFill>
+                  <a:srgbClr val="1C1A1A"/>
+                </a:solidFill>
+                <a:latin typeface="Arial"/>
+                <a:cs typeface="Arial"/>
+              </a:rPr>
+              <a:t> </a:t>
+            </a:r>
+            <a:r>
+              <a:rPr lang="en-US" sz="1400" spc="15" dirty="0">
                 <a:solidFill>
                   <a:srgbClr val="1C1A1A"/>
                 </a:solidFill>
@@ -21955,7 +22065,7 @@
               <a:t>with </a:t>
             </a:r>
             <a:r>
-              <a:rPr sz="1400" spc="20" dirty="0">
+              <a:rPr lang="en-US" sz="1400" spc="20" dirty="0">
                 <a:solidFill>
                   <a:srgbClr val="1C1A1A"/>
                 </a:solidFill>
@@ -21965,17 +22075,17 @@
               <a:t>the</a:t>
             </a:r>
             <a:r>
-              <a:rPr sz="1400" spc="70" dirty="0">
-                <a:solidFill>
-                  <a:srgbClr val="1C1A1A"/>
-                </a:solidFill>
-                <a:latin typeface="Arial"/>
-                <a:cs typeface="Arial"/>
-              </a:rPr>
-              <a:t> </a:t>
-            </a:r>
-            <a:r>
-              <a:rPr sz="1400" spc="-15" dirty="0">
+              <a:rPr lang="en-US" sz="1400" spc="70" dirty="0">
+                <a:solidFill>
+                  <a:srgbClr val="1C1A1A"/>
+                </a:solidFill>
+                <a:latin typeface="Arial"/>
+                <a:cs typeface="Arial"/>
+              </a:rPr>
+              <a:t> </a:t>
+            </a:r>
+            <a:r>
+              <a:rPr lang="en-US" sz="1400" spc="-15" dirty="0">
                 <a:solidFill>
                   <a:srgbClr val="1C1A1A"/>
                 </a:solidFill>
@@ -21985,17 +22095,17 @@
               <a:t>Plaid</a:t>
             </a:r>
             <a:r>
-              <a:rPr sz="1400" spc="-40" dirty="0">
-                <a:solidFill>
-                  <a:srgbClr val="1C1A1A"/>
-                </a:solidFill>
-                <a:latin typeface="Arial"/>
-                <a:cs typeface="Arial"/>
-              </a:rPr>
-              <a:t> </a:t>
-            </a:r>
-            <a:r>
-              <a:rPr sz="1400" spc="-60" dirty="0">
+              <a:rPr lang="en-US" sz="1400" spc="-40" dirty="0">
+                <a:solidFill>
+                  <a:srgbClr val="1C1A1A"/>
+                </a:solidFill>
+                <a:latin typeface="Arial"/>
+                <a:cs typeface="Arial"/>
+              </a:rPr>
+              <a:t> </a:t>
+            </a:r>
+            <a:r>
+              <a:rPr lang="en-US" sz="1400" spc="-60" dirty="0">
                 <a:solidFill>
                   <a:srgbClr val="1C1A1A"/>
                 </a:solidFill>
@@ -22005,17 +22115,17 @@
               <a:t>API.</a:t>
             </a:r>
             <a:r>
-              <a:rPr sz="1400" spc="-35" dirty="0">
-                <a:solidFill>
-                  <a:srgbClr val="1C1A1A"/>
-                </a:solidFill>
-                <a:latin typeface="Arial"/>
-                <a:cs typeface="Arial"/>
-              </a:rPr>
-              <a:t> </a:t>
-            </a:r>
-            <a:r>
-              <a:rPr sz="1400" spc="-30" dirty="0">
+              <a:rPr lang="en-US" sz="1400" spc="-35" dirty="0">
+                <a:solidFill>
+                  <a:srgbClr val="1C1A1A"/>
+                </a:solidFill>
+                <a:latin typeface="Arial"/>
+                <a:cs typeface="Arial"/>
+              </a:rPr>
+              <a:t> </a:t>
+            </a:r>
+            <a:r>
+              <a:rPr lang="en-US" sz="1400" spc="-30" dirty="0">
                 <a:solidFill>
                   <a:srgbClr val="1C1A1A"/>
                 </a:solidFill>
@@ -22025,17 +22135,17 @@
               <a:t>The</a:t>
             </a:r>
             <a:r>
-              <a:rPr sz="1400" spc="35" dirty="0">
-                <a:solidFill>
-                  <a:srgbClr val="1C1A1A"/>
-                </a:solidFill>
-                <a:latin typeface="Arial"/>
-                <a:cs typeface="Arial"/>
-              </a:rPr>
-              <a:t> </a:t>
-            </a:r>
-            <a:r>
-              <a:rPr sz="1400" spc="5" dirty="0">
+              <a:rPr lang="en-US" sz="1400" spc="35" dirty="0">
+                <a:solidFill>
+                  <a:srgbClr val="1C1A1A"/>
+                </a:solidFill>
+                <a:latin typeface="Arial"/>
+                <a:cs typeface="Arial"/>
+              </a:rPr>
+              <a:t> </a:t>
+            </a:r>
+            <a:r>
+              <a:rPr lang="en-US" sz="1400" spc="5" dirty="0">
                 <a:solidFill>
                   <a:srgbClr val="1C1A1A"/>
                 </a:solidFill>
@@ -22045,17 +22155,17 @@
               <a:t>application</a:t>
             </a:r>
             <a:r>
-              <a:rPr sz="1400" spc="70" dirty="0">
-                <a:solidFill>
-                  <a:srgbClr val="1C1A1A"/>
-                </a:solidFill>
-                <a:latin typeface="Arial"/>
-                <a:cs typeface="Arial"/>
-              </a:rPr>
-              <a:t> </a:t>
-            </a:r>
-            <a:r>
-              <a:rPr sz="1400" spc="-10" dirty="0">
+              <a:rPr lang="en-US" sz="1400" spc="70" dirty="0">
+                <a:solidFill>
+                  <a:srgbClr val="1C1A1A"/>
+                </a:solidFill>
+                <a:latin typeface="Arial"/>
+                <a:cs typeface="Arial"/>
+              </a:rPr>
+              <a:t> </a:t>
+            </a:r>
+            <a:r>
+              <a:rPr lang="en-US" sz="1400" spc="-10" dirty="0">
                 <a:solidFill>
                   <a:srgbClr val="1C1A1A"/>
                 </a:solidFill>
@@ -22065,17 +22175,17 @@
               <a:t>will</a:t>
             </a:r>
             <a:r>
-              <a:rPr sz="1400" spc="45" dirty="0">
-                <a:solidFill>
-                  <a:srgbClr val="1C1A1A"/>
-                </a:solidFill>
-                <a:latin typeface="Arial"/>
-                <a:cs typeface="Arial"/>
-              </a:rPr>
-              <a:t> </a:t>
-            </a:r>
-            <a:r>
-              <a:rPr sz="1400" spc="30" dirty="0">
+              <a:rPr lang="en-US" sz="1400" spc="45" dirty="0">
+                <a:solidFill>
+                  <a:srgbClr val="1C1A1A"/>
+                </a:solidFill>
+                <a:latin typeface="Arial"/>
+                <a:cs typeface="Arial"/>
+              </a:rPr>
+              <a:t> </a:t>
+            </a:r>
+            <a:r>
+              <a:rPr lang="en-US" sz="1400" spc="30" dirty="0">
                 <a:solidFill>
                   <a:srgbClr val="1C1A1A"/>
                 </a:solidFill>
@@ -22085,17 +22195,17 @@
               <a:t>fetch</a:t>
             </a:r>
             <a:r>
-              <a:rPr sz="1400" spc="25" dirty="0">
-                <a:solidFill>
-                  <a:srgbClr val="1C1A1A"/>
-                </a:solidFill>
-                <a:latin typeface="Arial"/>
-                <a:cs typeface="Arial"/>
-              </a:rPr>
-              <a:t> </a:t>
-            </a:r>
-            <a:r>
-              <a:rPr sz="1400" spc="5" dirty="0">
+              <a:rPr lang="en-US" sz="1400" spc="25" dirty="0">
+                <a:solidFill>
+                  <a:srgbClr val="1C1A1A"/>
+                </a:solidFill>
+                <a:latin typeface="Arial"/>
+                <a:cs typeface="Arial"/>
+              </a:rPr>
+              <a:t> </a:t>
+            </a:r>
+            <a:r>
+              <a:rPr lang="en-US" sz="1400" spc="5" dirty="0">
                 <a:solidFill>
                   <a:srgbClr val="1C1A1A"/>
                 </a:solidFill>
@@ -22105,17 +22215,17 @@
               <a:t>transactions</a:t>
             </a:r>
             <a:r>
-              <a:rPr sz="1400" spc="80" dirty="0">
-                <a:solidFill>
-                  <a:srgbClr val="1C1A1A"/>
-                </a:solidFill>
-                <a:latin typeface="Arial"/>
-                <a:cs typeface="Arial"/>
-              </a:rPr>
-              <a:t> </a:t>
-            </a:r>
-            <a:r>
-              <a:rPr sz="1400" spc="10" dirty="0">
+              <a:rPr lang="en-US" sz="1400" spc="80" dirty="0">
+                <a:solidFill>
+                  <a:srgbClr val="1C1A1A"/>
+                </a:solidFill>
+                <a:latin typeface="Arial"/>
+                <a:cs typeface="Arial"/>
+              </a:rPr>
+              <a:t> </a:t>
+            </a:r>
+            <a:r>
+              <a:rPr lang="en-US" sz="1400" spc="10" dirty="0">
                 <a:solidFill>
                   <a:srgbClr val="1C1A1A"/>
                 </a:solidFill>
@@ -22125,17 +22235,17 @@
               <a:t>directly</a:t>
             </a:r>
             <a:r>
-              <a:rPr sz="1400" spc="100" dirty="0">
-                <a:solidFill>
-                  <a:srgbClr val="1C1A1A"/>
-                </a:solidFill>
-                <a:latin typeface="Arial"/>
-                <a:cs typeface="Arial"/>
-              </a:rPr>
-              <a:t> </a:t>
-            </a:r>
-            <a:r>
-              <a:rPr sz="1400" dirty="0">
+              <a:rPr lang="en-US" sz="1400" spc="100" dirty="0">
+                <a:solidFill>
+                  <a:srgbClr val="1C1A1A"/>
+                </a:solidFill>
+                <a:latin typeface="Arial"/>
+                <a:cs typeface="Arial"/>
+              </a:rPr>
+              <a:t> </a:t>
+            </a:r>
+            <a:r>
+              <a:rPr lang="en-US" sz="1400" dirty="0">
                 <a:solidFill>
                   <a:srgbClr val="1C1A1A"/>
                 </a:solidFill>
@@ -22145,17 +22255,17 @@
               <a:t>using</a:t>
             </a:r>
             <a:r>
-              <a:rPr sz="1400" spc="-10" dirty="0">
-                <a:solidFill>
-                  <a:srgbClr val="1C1A1A"/>
-                </a:solidFill>
-                <a:latin typeface="Arial"/>
-                <a:cs typeface="Arial"/>
-              </a:rPr>
-              <a:t> </a:t>
-            </a:r>
-            <a:r>
-              <a:rPr sz="1400" spc="-65" dirty="0">
+              <a:rPr lang="en-US" sz="1400" spc="-10" dirty="0">
+                <a:solidFill>
+                  <a:srgbClr val="1C1A1A"/>
+                </a:solidFill>
+                <a:latin typeface="Arial"/>
+                <a:cs typeface="Arial"/>
+              </a:rPr>
+              <a:t> </a:t>
+            </a:r>
+            <a:r>
+              <a:rPr lang="en-US" sz="1400" spc="-65" dirty="0">
                 <a:solidFill>
                   <a:srgbClr val="1C1A1A"/>
                 </a:solidFill>
@@ -22165,17 +22275,17 @@
               <a:t>a</a:t>
             </a:r>
             <a:r>
-              <a:rPr sz="1400" spc="65" dirty="0">
-                <a:solidFill>
-                  <a:srgbClr val="1C1A1A"/>
-                </a:solidFill>
-                <a:latin typeface="Arial"/>
-                <a:cs typeface="Arial"/>
-              </a:rPr>
-              <a:t> </a:t>
-            </a:r>
-            <a:r>
-              <a:rPr sz="1400" dirty="0">
+              <a:rPr lang="en-US" sz="1400" spc="65" dirty="0">
+                <a:solidFill>
+                  <a:srgbClr val="1C1A1A"/>
+                </a:solidFill>
+                <a:latin typeface="Arial"/>
+                <a:cs typeface="Arial"/>
+              </a:rPr>
+              <a:t> </a:t>
+            </a:r>
+            <a:r>
+              <a:rPr lang="en-US" sz="1400" dirty="0">
                 <a:solidFill>
                   <a:srgbClr val="1C1A1A"/>
                 </a:solidFill>
@@ -22185,17 +22295,17 @@
               <a:t>locally</a:t>
             </a:r>
             <a:r>
-              <a:rPr sz="1400" spc="-5" dirty="0">
-                <a:solidFill>
-                  <a:srgbClr val="1C1A1A"/>
-                </a:solidFill>
-                <a:latin typeface="Arial"/>
-                <a:cs typeface="Arial"/>
-              </a:rPr>
-              <a:t> </a:t>
-            </a:r>
-            <a:r>
-              <a:rPr sz="1400" spc="20" dirty="0">
+              <a:rPr lang="en-US" sz="1400" spc="-5" dirty="0">
+                <a:solidFill>
+                  <a:srgbClr val="1C1A1A"/>
+                </a:solidFill>
+                <a:latin typeface="Arial"/>
+                <a:cs typeface="Arial"/>
+              </a:rPr>
+              <a:t> </a:t>
+            </a:r>
+            <a:r>
+              <a:rPr lang="en-US" sz="1400" spc="20" dirty="0">
                 <a:solidFill>
                   <a:srgbClr val="1C1A1A"/>
                 </a:solidFill>
@@ -22205,17 +22315,17 @@
               <a:t>stored</a:t>
             </a:r>
             <a:r>
-              <a:rPr sz="1400" spc="30" dirty="0">
-                <a:solidFill>
-                  <a:srgbClr val="1C1A1A"/>
-                </a:solidFill>
-                <a:latin typeface="Arial"/>
-                <a:cs typeface="Arial"/>
-              </a:rPr>
-              <a:t> </a:t>
-            </a:r>
-            <a:r>
-              <a:rPr sz="1400" spc="-10" dirty="0">
+              <a:rPr lang="en-US" sz="1400" spc="30" dirty="0">
+                <a:solidFill>
+                  <a:srgbClr val="1C1A1A"/>
+                </a:solidFill>
+                <a:latin typeface="Arial"/>
+                <a:cs typeface="Arial"/>
+              </a:rPr>
+              <a:t> </a:t>
+            </a:r>
+            <a:r>
+              <a:rPr lang="en-US" sz="1400" spc="-10" dirty="0">
                 <a:solidFill>
                   <a:srgbClr val="1C1A1A"/>
                 </a:solidFill>
@@ -22225,17 +22335,17 @@
               <a:t>access</a:t>
             </a:r>
             <a:r>
-              <a:rPr sz="1400" spc="45" dirty="0">
-                <a:solidFill>
-                  <a:srgbClr val="1C1A1A"/>
-                </a:solidFill>
-                <a:latin typeface="Arial"/>
-                <a:cs typeface="Arial"/>
-              </a:rPr>
-              <a:t> </a:t>
-            </a:r>
-            <a:r>
-              <a:rPr sz="1400" dirty="0">
+              <a:rPr lang="en-US" sz="1400" spc="45" dirty="0">
+                <a:solidFill>
+                  <a:srgbClr val="1C1A1A"/>
+                </a:solidFill>
+                <a:latin typeface="Arial"/>
+                <a:cs typeface="Arial"/>
+              </a:rPr>
+              <a:t> </a:t>
+            </a:r>
+            <a:r>
+              <a:rPr lang="en-US" sz="1400" dirty="0">
                 <a:solidFill>
                   <a:srgbClr val="1C1A1A"/>
                 </a:solidFill>
@@ -22245,17 +22355,17 @@
               <a:t>token, maintaining</a:t>
             </a:r>
             <a:r>
-              <a:rPr sz="1400" spc="45" dirty="0">
-                <a:solidFill>
-                  <a:srgbClr val="1C1A1A"/>
-                </a:solidFill>
-                <a:latin typeface="Arial"/>
-                <a:cs typeface="Arial"/>
-              </a:rPr>
-              <a:t> </a:t>
-            </a:r>
-            <a:r>
-              <a:rPr sz="1400" spc="20" dirty="0">
+              <a:rPr lang="en-US" sz="1400" spc="45" dirty="0">
+                <a:solidFill>
+                  <a:srgbClr val="1C1A1A"/>
+                </a:solidFill>
+                <a:latin typeface="Arial"/>
+                <a:cs typeface="Arial"/>
+              </a:rPr>
+              <a:t> </a:t>
+            </a:r>
+            <a:r>
+              <a:rPr lang="en-US" sz="1400" spc="20" dirty="0">
                 <a:solidFill>
                   <a:srgbClr val="1C1A1A"/>
                 </a:solidFill>
@@ -22265,17 +22375,17 @@
               <a:t>the</a:t>
             </a:r>
             <a:r>
-              <a:rPr sz="1400" spc="70" dirty="0">
-                <a:solidFill>
-                  <a:srgbClr val="1C1A1A"/>
-                </a:solidFill>
-                <a:latin typeface="Arial"/>
-                <a:cs typeface="Arial"/>
-              </a:rPr>
-              <a:t> </a:t>
-            </a:r>
-            <a:r>
-              <a:rPr sz="1400" spc="25" dirty="0">
+              <a:rPr lang="en-US" sz="1400" spc="70" dirty="0">
+                <a:solidFill>
+                  <a:srgbClr val="1C1A1A"/>
+                </a:solidFill>
+                <a:latin typeface="Arial"/>
+                <a:cs typeface="Arial"/>
+              </a:rPr>
+              <a:t> </a:t>
+            </a:r>
+            <a:r>
+              <a:rPr lang="en-US" sz="1400" spc="25" dirty="0">
                 <a:solidFill>
                   <a:srgbClr val="1C1A1A"/>
                 </a:solidFill>
@@ -22285,17 +22395,17 @@
               <a:t>"local-first"</a:t>
             </a:r>
             <a:r>
-              <a:rPr sz="1400" spc="90" dirty="0">
-                <a:solidFill>
-                  <a:srgbClr val="1C1A1A"/>
-                </a:solidFill>
-                <a:latin typeface="Arial"/>
-                <a:cs typeface="Arial"/>
-              </a:rPr>
-              <a:t> </a:t>
-            </a:r>
-            <a:r>
-              <a:rPr sz="1400" spc="15" dirty="0">
+              <a:rPr lang="en-US" sz="1400" spc="90" dirty="0">
+                <a:solidFill>
+                  <a:srgbClr val="1C1A1A"/>
+                </a:solidFill>
+                <a:latin typeface="Arial"/>
+                <a:cs typeface="Arial"/>
+              </a:rPr>
+              <a:t> </a:t>
+            </a:r>
+            <a:r>
+              <a:rPr lang="en-US" sz="1400" spc="15" dirty="0">
                 <a:solidFill>
                   <a:srgbClr val="1C1A1A"/>
                 </a:solidFill>
@@ -22305,17 +22415,17 @@
               <a:t>architecture</a:t>
             </a:r>
             <a:r>
-              <a:rPr sz="1400" spc="45" dirty="0">
-                <a:solidFill>
-                  <a:srgbClr val="1C1A1A"/>
-                </a:solidFill>
-                <a:latin typeface="Arial"/>
-                <a:cs typeface="Arial"/>
-              </a:rPr>
-              <a:t> </a:t>
-            </a:r>
-            <a:r>
-              <a:rPr sz="1400" spc="-5" dirty="0">
+              <a:rPr lang="en-US" sz="1400" spc="45" dirty="0">
+                <a:solidFill>
+                  <a:srgbClr val="1C1A1A"/>
+                </a:solidFill>
+                <a:latin typeface="Arial"/>
+                <a:cs typeface="Arial"/>
+              </a:rPr>
+              <a:t> </a:t>
+            </a:r>
+            <a:r>
+              <a:rPr lang="en-US" sz="1400" spc="-5" dirty="0">
                 <a:solidFill>
                   <a:srgbClr val="1C1A1A"/>
                 </a:solidFill>
@@ -22325,17 +22435,17 @@
               <a:t>while</a:t>
             </a:r>
             <a:r>
-              <a:rPr sz="1400" spc="75" dirty="0">
-                <a:solidFill>
-                  <a:srgbClr val="1C1A1A"/>
-                </a:solidFill>
-                <a:latin typeface="Arial"/>
-                <a:cs typeface="Arial"/>
-              </a:rPr>
-              <a:t> </a:t>
-            </a:r>
-            <a:r>
-              <a:rPr sz="1400" spc="10" dirty="0">
+              <a:rPr lang="en-US" sz="1400" spc="75" dirty="0">
+                <a:solidFill>
+                  <a:srgbClr val="1C1A1A"/>
+                </a:solidFill>
+                <a:latin typeface="Arial"/>
+                <a:cs typeface="Arial"/>
+              </a:rPr>
+              <a:t> </a:t>
+            </a:r>
+            <a:r>
+              <a:rPr lang="en-US" sz="1400" spc="10" dirty="0">
                 <a:solidFill>
                   <a:srgbClr val="1C1A1A"/>
                 </a:solidFill>
@@ -22345,17 +22455,17 @@
               <a:t>adding</a:t>
             </a:r>
             <a:r>
-              <a:rPr sz="1400" spc="45" dirty="0">
-                <a:solidFill>
-                  <a:srgbClr val="1C1A1A"/>
-                </a:solidFill>
-                <a:latin typeface="Arial"/>
-                <a:cs typeface="Arial"/>
-              </a:rPr>
-              <a:t> </a:t>
-            </a:r>
-            <a:r>
-              <a:rPr sz="1400" spc="-15" dirty="0">
+              <a:rPr lang="en-US" sz="1400" spc="45" dirty="0">
+                <a:solidFill>
+                  <a:srgbClr val="1C1A1A"/>
+                </a:solidFill>
+                <a:latin typeface="Arial"/>
+                <a:cs typeface="Arial"/>
+              </a:rPr>
+              <a:t> </a:t>
+            </a:r>
+            <a:r>
+              <a:rPr lang="en-US" sz="1400" spc="-15" dirty="0">
                 <a:solidFill>
                   <a:srgbClr val="1C1A1A"/>
                 </a:solidFill>
@@ -22365,17 +22475,17 @@
               <a:t>sync</a:t>
             </a:r>
             <a:r>
-              <a:rPr sz="1400" spc="75" dirty="0">
-                <a:solidFill>
-                  <a:srgbClr val="1C1A1A"/>
-                </a:solidFill>
-                <a:latin typeface="Arial"/>
-                <a:cs typeface="Arial"/>
-              </a:rPr>
-              <a:t> </a:t>
-            </a:r>
-            <a:r>
-              <a:rPr sz="1400" spc="-10" dirty="0">
+              <a:rPr lang="en-US" sz="1400" spc="75" dirty="0">
+                <a:solidFill>
+                  <a:srgbClr val="1C1A1A"/>
+                </a:solidFill>
+                <a:latin typeface="Arial"/>
+                <a:cs typeface="Arial"/>
+              </a:rPr>
+              <a:t> </a:t>
+            </a:r>
+            <a:r>
+              <a:rPr lang="en-US" sz="1400" spc="-10" dirty="0">
                 <a:solidFill>
                   <a:srgbClr val="1C1A1A"/>
                 </a:solidFill>
@@ -22384,7 +22494,7 @@
               </a:rPr>
               <a:t>convenience.</a:t>
             </a:r>
-            <a:endParaRPr sz="1400" dirty="0">
+            <a:endParaRPr lang="en-US" sz="1400" dirty="0">
               <a:latin typeface="Arial"/>
               <a:cs typeface="Arial"/>
             </a:endParaRPr>
@@ -22407,47 +22517,7 @@
               </a:tabLst>
             </a:pPr>
             <a:r>
-              <a:rPr sz="1400" b="1" spc="-10" dirty="0">
-                <a:solidFill>
-                  <a:srgbClr val="1C1A1A"/>
-                </a:solidFill>
-                <a:latin typeface="Arial"/>
-                <a:cs typeface="Arial"/>
-              </a:rPr>
-              <a:t>Phase</a:t>
-            </a:r>
-            <a:r>
-              <a:rPr sz="1400" b="1" spc="-25" dirty="0">
-                <a:solidFill>
-                  <a:srgbClr val="1C1A1A"/>
-                </a:solidFill>
-                <a:latin typeface="Arial"/>
-                <a:cs typeface="Arial"/>
-              </a:rPr>
-              <a:t> </a:t>
-            </a:r>
-            <a:r>
-              <a:rPr sz="1400" b="1" dirty="0">
-                <a:solidFill>
-                  <a:srgbClr val="1C1A1A"/>
-                </a:solidFill>
-                <a:latin typeface="Arial"/>
-                <a:cs typeface="Arial"/>
-              </a:rPr>
-              <a:t>2:</a:t>
-            </a:r>
-            <a:r>
-              <a:rPr sz="1400" b="1" spc="-10" dirty="0">
-                <a:solidFill>
-                  <a:srgbClr val="1C1A1A"/>
-                </a:solidFill>
-                <a:latin typeface="Arial"/>
-                <a:cs typeface="Arial"/>
-              </a:rPr>
-              <a:t> </a:t>
-            </a:r>
-            <a:r>
-              <a:rPr sz="1400" b="1" spc="5" dirty="0">
+              <a:rPr lang="en-US" sz="1400" b="1" spc="5" dirty="0">
                 <a:solidFill>
                   <a:srgbClr val="1C1A1A"/>
                 </a:solidFill>
@@ -22457,17 +22527,17 @@
               <a:t>Intelligent</a:t>
             </a:r>
             <a:r>
-              <a:rPr sz="1400" b="1" spc="95" dirty="0">
-                <a:solidFill>
-                  <a:srgbClr val="1C1A1A"/>
-                </a:solidFill>
-                <a:latin typeface="Arial"/>
-                <a:cs typeface="Arial"/>
-              </a:rPr>
-              <a:t> </a:t>
-            </a:r>
-            <a:r>
-              <a:rPr sz="1400" b="1" spc="-20" dirty="0">
+              <a:rPr lang="en-US" sz="1400" b="1" spc="95" dirty="0">
+                <a:solidFill>
+                  <a:srgbClr val="1C1A1A"/>
+                </a:solidFill>
+                <a:latin typeface="Arial"/>
+                <a:cs typeface="Arial"/>
+              </a:rPr>
+              <a:t> </a:t>
+            </a:r>
+            <a:r>
+              <a:rPr lang="en-US" sz="1400" b="1" spc="-20" dirty="0">
                 <a:solidFill>
                   <a:srgbClr val="1C1A1A"/>
                 </a:solidFill>
@@ -22477,17 +22547,17 @@
               <a:t>ML</a:t>
             </a:r>
             <a:r>
-              <a:rPr sz="1400" b="1" spc="-10" dirty="0">
-                <a:solidFill>
-                  <a:srgbClr val="1C1A1A"/>
-                </a:solidFill>
-                <a:latin typeface="Arial"/>
-                <a:cs typeface="Arial"/>
-              </a:rPr>
-              <a:t> </a:t>
-            </a:r>
-            <a:r>
-              <a:rPr sz="1400" b="1" spc="5" dirty="0">
+              <a:rPr lang="en-US" sz="1400" b="1" spc="-10" dirty="0">
+                <a:solidFill>
+                  <a:srgbClr val="1C1A1A"/>
+                </a:solidFill>
+                <a:latin typeface="Arial"/>
+                <a:cs typeface="Arial"/>
+              </a:rPr>
+              <a:t> </a:t>
+            </a:r>
+            <a:r>
+              <a:rPr lang="en-US" sz="1400" b="1" spc="5" dirty="0">
                 <a:solidFill>
                   <a:srgbClr val="1C1A1A"/>
                 </a:solidFill>
@@ -22497,27 +22567,27 @@
               <a:t>Categorization:</a:t>
             </a:r>
             <a:r>
-              <a:rPr sz="1400" b="1" dirty="0">
-                <a:solidFill>
-                  <a:srgbClr val="1C1A1A"/>
-                </a:solidFill>
-                <a:latin typeface="Arial"/>
-                <a:cs typeface="Arial"/>
-              </a:rPr>
-              <a:t> </a:t>
-            </a:r>
-            <a:r>
-              <a:rPr sz="1400" b="1" spc="-140" dirty="0">
-                <a:solidFill>
-                  <a:srgbClr val="1C1A1A"/>
-                </a:solidFill>
-                <a:latin typeface="Arial"/>
-                <a:cs typeface="Arial"/>
-              </a:rPr>
-              <a:t> </a:t>
-            </a:r>
-            <a:r>
-              <a:rPr sz="1400" spc="-20" dirty="0">
+              <a:rPr lang="en-US" sz="1400" b="1" dirty="0">
+                <a:solidFill>
+                  <a:srgbClr val="1C1A1A"/>
+                </a:solidFill>
+                <a:latin typeface="Arial"/>
+                <a:cs typeface="Arial"/>
+              </a:rPr>
+              <a:t> </a:t>
+            </a:r>
+            <a:r>
+              <a:rPr lang="en-US" sz="1400" b="1" spc="-140" dirty="0">
+                <a:solidFill>
+                  <a:srgbClr val="1C1A1A"/>
+                </a:solidFill>
+                <a:latin typeface="Arial"/>
+                <a:cs typeface="Arial"/>
+              </a:rPr>
+              <a:t> </a:t>
+            </a:r>
+            <a:r>
+              <a:rPr lang="en-US" sz="1400" spc="-20" dirty="0">
                 <a:solidFill>
                   <a:srgbClr val="1C1A1A"/>
                 </a:solidFill>
@@ -22527,17 +22597,17 @@
               <a:t>Replace</a:t>
             </a:r>
             <a:r>
-              <a:rPr sz="1400" spc="5" dirty="0">
-                <a:solidFill>
-                  <a:srgbClr val="1C1A1A"/>
-                </a:solidFill>
-                <a:latin typeface="Arial"/>
-                <a:cs typeface="Arial"/>
-              </a:rPr>
-              <a:t> </a:t>
-            </a:r>
-            <a:r>
-              <a:rPr sz="1400" spc="15" dirty="0">
+              <a:rPr lang="en-US" sz="1400" spc="5" dirty="0">
+                <a:solidFill>
+                  <a:srgbClr val="1C1A1A"/>
+                </a:solidFill>
+                <a:latin typeface="Arial"/>
+                <a:cs typeface="Arial"/>
+              </a:rPr>
+              <a:t> </a:t>
+            </a:r>
+            <a:r>
+              <a:rPr lang="en-US" sz="1400" spc="15" dirty="0">
                 <a:solidFill>
                   <a:srgbClr val="1C1A1A"/>
                 </a:solidFill>
@@ -22547,17 +22617,17 @@
               <a:t>static</a:t>
             </a:r>
             <a:r>
-              <a:rPr sz="1400" spc="80" dirty="0">
-                <a:solidFill>
-                  <a:srgbClr val="1C1A1A"/>
-                </a:solidFill>
-                <a:latin typeface="Arial"/>
-                <a:cs typeface="Arial"/>
-              </a:rPr>
-              <a:t> </a:t>
-            </a:r>
-            <a:r>
-              <a:rPr sz="1400" spc="5" dirty="0">
+              <a:rPr lang="en-US" sz="1400" spc="80" dirty="0">
+                <a:solidFill>
+                  <a:srgbClr val="1C1A1A"/>
+                </a:solidFill>
+                <a:latin typeface="Arial"/>
+                <a:cs typeface="Arial"/>
+              </a:rPr>
+              <a:t> </a:t>
+            </a:r>
+            <a:r>
+              <a:rPr lang="en-US" sz="1400" spc="5" dirty="0">
                 <a:solidFill>
                   <a:srgbClr val="1C1A1A"/>
                 </a:solidFill>
@@ -22567,17 +22637,17 @@
               <a:t>keywords</a:t>
             </a:r>
             <a:r>
-              <a:rPr sz="1400" spc="20" dirty="0">
-                <a:solidFill>
-                  <a:srgbClr val="1C1A1A"/>
-                </a:solidFill>
-                <a:latin typeface="Arial"/>
-                <a:cs typeface="Arial"/>
-              </a:rPr>
-              <a:t> </a:t>
-            </a:r>
-            <a:r>
-              <a:rPr sz="1400" spc="10" dirty="0">
+              <a:rPr lang="en-US" sz="1400" spc="20" dirty="0">
+                <a:solidFill>
+                  <a:srgbClr val="1C1A1A"/>
+                </a:solidFill>
+                <a:latin typeface="Arial"/>
+                <a:cs typeface="Arial"/>
+              </a:rPr>
+              <a:t> </a:t>
+            </a:r>
+            <a:r>
+              <a:rPr lang="en-US" sz="1400" spc="10" dirty="0">
                 <a:solidFill>
                   <a:srgbClr val="1C1A1A"/>
                 </a:solidFill>
@@ -22587,17 +22657,17 @@
               <a:t>with</a:t>
             </a:r>
             <a:r>
-              <a:rPr sz="1400" spc="35" dirty="0">
-                <a:solidFill>
-                  <a:srgbClr val="1C1A1A"/>
-                </a:solidFill>
-                <a:latin typeface="Arial"/>
-                <a:cs typeface="Arial"/>
-              </a:rPr>
-              <a:t> </a:t>
-            </a:r>
-            <a:r>
-              <a:rPr sz="1400" spc="-65" dirty="0">
+              <a:rPr lang="en-US" sz="1400" spc="35" dirty="0">
+                <a:solidFill>
+                  <a:srgbClr val="1C1A1A"/>
+                </a:solidFill>
+                <a:latin typeface="Arial"/>
+                <a:cs typeface="Arial"/>
+              </a:rPr>
+              <a:t> </a:t>
+            </a:r>
+            <a:r>
+              <a:rPr lang="en-US" sz="1400" spc="-65" dirty="0">
                 <a:solidFill>
                   <a:srgbClr val="1C1A1A"/>
                 </a:solidFill>
@@ -22607,17 +22677,17 @@
               <a:t>a</a:t>
             </a:r>
             <a:r>
-              <a:rPr sz="1400" spc="20" dirty="0">
-                <a:solidFill>
-                  <a:srgbClr val="1C1A1A"/>
-                </a:solidFill>
-                <a:latin typeface="Arial"/>
-                <a:cs typeface="Arial"/>
-              </a:rPr>
-              <a:t> </a:t>
-            </a:r>
-            <a:r>
-              <a:rPr sz="1400" spc="15" dirty="0">
+              <a:rPr lang="en-US" sz="1400" spc="20" dirty="0">
+                <a:solidFill>
+                  <a:srgbClr val="1C1A1A"/>
+                </a:solidFill>
+                <a:latin typeface="Arial"/>
+                <a:cs typeface="Arial"/>
+              </a:rPr>
+              <a:t> </a:t>
+            </a:r>
+            <a:r>
+              <a:rPr lang="en-US" sz="1400" spc="15" dirty="0">
                 <a:solidFill>
                   <a:srgbClr val="1C1A1A"/>
                 </a:solidFill>
@@ -22627,17 +22697,17 @@
               <a:t>scikit-learn</a:t>
             </a:r>
             <a:r>
-              <a:rPr sz="1400" spc="10" dirty="0">
-                <a:solidFill>
-                  <a:srgbClr val="1C1A1A"/>
-                </a:solidFill>
-                <a:latin typeface="Arial"/>
-                <a:cs typeface="Arial"/>
-              </a:rPr>
-              <a:t> </a:t>
-            </a:r>
-            <a:r>
-              <a:rPr sz="1400" spc="-20" dirty="0">
+              <a:rPr lang="en-US" sz="1400" spc="10" dirty="0">
+                <a:solidFill>
+                  <a:srgbClr val="1C1A1A"/>
+                </a:solidFill>
+                <a:latin typeface="Arial"/>
+                <a:cs typeface="Arial"/>
+              </a:rPr>
+              <a:t> </a:t>
+            </a:r>
+            <a:r>
+              <a:rPr lang="en-US" sz="1400" spc="-20" dirty="0">
                 <a:solidFill>
                   <a:srgbClr val="1C1A1A"/>
                 </a:solidFill>
@@ -22647,17 +22717,17 @@
               <a:t>Naive</a:t>
             </a:r>
             <a:r>
-              <a:rPr sz="1400" spc="25" dirty="0">
-                <a:solidFill>
-                  <a:srgbClr val="1C1A1A"/>
-                </a:solidFill>
-                <a:latin typeface="Arial"/>
-                <a:cs typeface="Arial"/>
-              </a:rPr>
-              <a:t> </a:t>
-            </a:r>
-            <a:r>
-              <a:rPr sz="1400" spc="-35" dirty="0">
+              <a:rPr lang="en-US" sz="1400" spc="25" dirty="0">
+                <a:solidFill>
+                  <a:srgbClr val="1C1A1A"/>
+                </a:solidFill>
+                <a:latin typeface="Arial"/>
+                <a:cs typeface="Arial"/>
+              </a:rPr>
+              <a:t> </a:t>
+            </a:r>
+            <a:r>
+              <a:rPr lang="en-US" sz="1400" spc="-35" dirty="0">
                 <a:solidFill>
                   <a:srgbClr val="1C1A1A"/>
                 </a:solidFill>
@@ -22667,17 +22737,17 @@
               <a:t>Bayes</a:t>
             </a:r>
             <a:r>
-              <a:rPr sz="1400" spc="-5" dirty="0">
-                <a:solidFill>
-                  <a:srgbClr val="1C1A1A"/>
-                </a:solidFill>
-                <a:latin typeface="Arial"/>
-                <a:cs typeface="Arial"/>
-              </a:rPr>
-              <a:t> </a:t>
-            </a:r>
-            <a:r>
-              <a:rPr sz="1400" dirty="0">
+              <a:rPr lang="en-US" sz="1400" spc="-5" dirty="0">
+                <a:solidFill>
+                  <a:srgbClr val="1C1A1A"/>
+                </a:solidFill>
+                <a:latin typeface="Arial"/>
+                <a:cs typeface="Arial"/>
+              </a:rPr>
+              <a:t> </a:t>
+            </a:r>
+            <a:r>
+              <a:rPr lang="en-US" sz="1400" dirty="0">
                 <a:solidFill>
                   <a:srgbClr val="1C1A1A"/>
                 </a:solidFill>
@@ -22687,17 +22757,17 @@
               <a:t>classifier.</a:t>
             </a:r>
             <a:r>
-              <a:rPr sz="1400" spc="-5" dirty="0">
-                <a:solidFill>
-                  <a:srgbClr val="1C1A1A"/>
-                </a:solidFill>
-                <a:latin typeface="Arial"/>
-                <a:cs typeface="Arial"/>
-              </a:rPr>
-              <a:t> </a:t>
-            </a:r>
-            <a:r>
-              <a:rPr sz="1400" spc="-30" dirty="0">
+              <a:rPr lang="en-US" sz="1400" spc="-5" dirty="0">
+                <a:solidFill>
+                  <a:srgbClr val="1C1A1A"/>
+                </a:solidFill>
+                <a:latin typeface="Arial"/>
+                <a:cs typeface="Arial"/>
+              </a:rPr>
+              <a:t> </a:t>
+            </a:r>
+            <a:r>
+              <a:rPr lang="en-US" sz="1400" spc="-30" dirty="0">
                 <a:solidFill>
                   <a:srgbClr val="1C1A1A"/>
                 </a:solidFill>
@@ -22707,17 +22777,17 @@
               <a:t>The</a:t>
             </a:r>
             <a:r>
-              <a:rPr sz="1400" spc="35" dirty="0">
-                <a:solidFill>
-                  <a:srgbClr val="1C1A1A"/>
-                </a:solidFill>
-                <a:latin typeface="Arial"/>
-                <a:cs typeface="Arial"/>
-              </a:rPr>
-              <a:t> </a:t>
-            </a:r>
-            <a:r>
-              <a:rPr sz="1400" spc="-10" dirty="0">
+              <a:rPr lang="en-US" sz="1400" spc="35" dirty="0">
+                <a:solidFill>
+                  <a:srgbClr val="1C1A1A"/>
+                </a:solidFill>
+                <a:latin typeface="Arial"/>
+                <a:cs typeface="Arial"/>
+              </a:rPr>
+              <a:t> </a:t>
+            </a:r>
+            <a:r>
+              <a:rPr lang="en-US" sz="1400" spc="-10" dirty="0">
                 <a:solidFill>
                   <a:srgbClr val="1C1A1A"/>
                 </a:solidFill>
@@ -22727,17 +22797,17 @@
               <a:t>system</a:t>
             </a:r>
             <a:r>
-              <a:rPr sz="1400" spc="20" dirty="0">
-                <a:solidFill>
-                  <a:srgbClr val="1C1A1A"/>
-                </a:solidFill>
-                <a:latin typeface="Arial"/>
-                <a:cs typeface="Arial"/>
-              </a:rPr>
-              <a:t> </a:t>
-            </a:r>
-            <a:r>
-              <a:rPr sz="1400" dirty="0">
+              <a:rPr lang="en-US" sz="1400" spc="20" dirty="0">
+                <a:solidFill>
+                  <a:srgbClr val="1C1A1A"/>
+                </a:solidFill>
+                <a:latin typeface="Arial"/>
+                <a:cs typeface="Arial"/>
+              </a:rPr>
+              <a:t> </a:t>
+            </a:r>
+            <a:r>
+              <a:rPr lang="en-US" sz="1400" dirty="0">
                 <a:solidFill>
                   <a:srgbClr val="1C1A1A"/>
                 </a:solidFill>
@@ -22747,17 +22817,17 @@
               <a:t>will</a:t>
             </a:r>
             <a:r>
-              <a:rPr sz="1400" spc="60" dirty="0">
-                <a:solidFill>
-                  <a:srgbClr val="1C1A1A"/>
-                </a:solidFill>
-                <a:latin typeface="Arial"/>
-                <a:cs typeface="Arial"/>
-              </a:rPr>
-              <a:t> </a:t>
-            </a:r>
-            <a:r>
-              <a:rPr sz="1400" dirty="0">
+              <a:rPr lang="en-US" sz="1400" spc="60" dirty="0">
+                <a:solidFill>
+                  <a:srgbClr val="1C1A1A"/>
+                </a:solidFill>
+                <a:latin typeface="Arial"/>
+                <a:cs typeface="Arial"/>
+              </a:rPr>
+              <a:t> </a:t>
+            </a:r>
+            <a:r>
+              <a:rPr lang="en-US" sz="1400" dirty="0">
                 <a:solidFill>
                   <a:srgbClr val="1C1A1A"/>
                 </a:solidFill>
@@ -22767,17 +22837,17 @@
               <a:t>learn</a:t>
             </a:r>
             <a:r>
-              <a:rPr sz="1400" spc="-25" dirty="0">
-                <a:solidFill>
-                  <a:srgbClr val="1C1A1A"/>
-                </a:solidFill>
-                <a:latin typeface="Arial"/>
-                <a:cs typeface="Arial"/>
-              </a:rPr>
-              <a:t> </a:t>
-            </a:r>
-            <a:r>
-              <a:rPr sz="1400" spc="20" dirty="0">
+              <a:rPr lang="en-US" sz="1400" spc="-25" dirty="0">
+                <a:solidFill>
+                  <a:srgbClr val="1C1A1A"/>
+                </a:solidFill>
+                <a:latin typeface="Arial"/>
+                <a:cs typeface="Arial"/>
+              </a:rPr>
+              <a:t> </a:t>
+            </a:r>
+            <a:r>
+              <a:rPr lang="en-US" sz="1400" spc="20" dirty="0">
                 <a:solidFill>
                   <a:srgbClr val="1C1A1A"/>
                 </a:solidFill>
@@ -22787,17 +22857,17 @@
               <a:t>from</a:t>
             </a:r>
             <a:r>
-              <a:rPr sz="1400" spc="70" dirty="0">
-                <a:solidFill>
-                  <a:srgbClr val="1C1A1A"/>
-                </a:solidFill>
-                <a:latin typeface="Arial"/>
-                <a:cs typeface="Arial"/>
-              </a:rPr>
-              <a:t> </a:t>
-            </a:r>
-            <a:r>
-              <a:rPr sz="1400" spc="-15" dirty="0">
+              <a:rPr lang="en-US" sz="1400" spc="70" dirty="0">
+                <a:solidFill>
+                  <a:srgbClr val="1C1A1A"/>
+                </a:solidFill>
+                <a:latin typeface="Arial"/>
+                <a:cs typeface="Arial"/>
+              </a:rPr>
+              <a:t> </a:t>
+            </a:r>
+            <a:r>
+              <a:rPr lang="en-US" sz="1400" spc="-15" dirty="0">
                 <a:solidFill>
                   <a:srgbClr val="1C1A1A"/>
                 </a:solidFill>
@@ -22807,17 +22877,17 @@
               <a:t>user</a:t>
             </a:r>
             <a:r>
-              <a:rPr sz="1400" spc="40" dirty="0">
-                <a:solidFill>
-                  <a:srgbClr val="1C1A1A"/>
-                </a:solidFill>
-                <a:latin typeface="Arial"/>
-                <a:cs typeface="Arial"/>
-              </a:rPr>
-              <a:t> </a:t>
-            </a:r>
-            <a:r>
-              <a:rPr sz="1400" spc="5" dirty="0">
+              <a:rPr lang="en-US" sz="1400" spc="40" dirty="0">
+                <a:solidFill>
+                  <a:srgbClr val="1C1A1A"/>
+                </a:solidFill>
+                <a:latin typeface="Arial"/>
+                <a:cs typeface="Arial"/>
+              </a:rPr>
+              <a:t> </a:t>
+            </a:r>
+            <a:r>
+              <a:rPr lang="en-US" sz="1400" spc="5" dirty="0">
                 <a:solidFill>
                   <a:srgbClr val="1C1A1A"/>
                 </a:solidFill>
@@ -22827,17 +22897,17 @@
               <a:t>corrections,</a:t>
             </a:r>
             <a:r>
-              <a:rPr sz="1400" spc="90" dirty="0">
-                <a:solidFill>
-                  <a:srgbClr val="1C1A1A"/>
-                </a:solidFill>
-                <a:latin typeface="Arial"/>
-                <a:cs typeface="Arial"/>
-              </a:rPr>
-              <a:t> </a:t>
-            </a:r>
-            <a:r>
-              <a:rPr sz="1400" spc="10" dirty="0">
+              <a:rPr lang="en-US" sz="1400" spc="90" dirty="0">
+                <a:solidFill>
+                  <a:srgbClr val="1C1A1A"/>
+                </a:solidFill>
+                <a:latin typeface="Arial"/>
+                <a:cs typeface="Arial"/>
+              </a:rPr>
+              <a:t> </a:t>
+            </a:r>
+            <a:r>
+              <a:rPr lang="en-US" sz="1400" spc="10" dirty="0">
                 <a:solidFill>
                   <a:srgbClr val="1C1A1A"/>
                 </a:solidFill>
@@ -22847,17 +22917,17 @@
               <a:t>creating</a:t>
             </a:r>
             <a:r>
-              <a:rPr sz="1400" spc="25" dirty="0">
-                <a:solidFill>
-                  <a:srgbClr val="1C1A1A"/>
-                </a:solidFill>
-                <a:latin typeface="Arial"/>
-                <a:cs typeface="Arial"/>
-              </a:rPr>
-              <a:t> </a:t>
-            </a:r>
-            <a:r>
-              <a:rPr sz="1400" spc="-65" dirty="0">
+              <a:rPr lang="en-US" sz="1400" spc="25" dirty="0">
+                <a:solidFill>
+                  <a:srgbClr val="1C1A1A"/>
+                </a:solidFill>
+                <a:latin typeface="Arial"/>
+                <a:cs typeface="Arial"/>
+              </a:rPr>
+              <a:t> </a:t>
+            </a:r>
+            <a:r>
+              <a:rPr lang="en-US" sz="1400" spc="-65" dirty="0">
                 <a:solidFill>
                   <a:srgbClr val="1C1A1A"/>
                 </a:solidFill>
@@ -22867,17 +22937,17 @@
               <a:t>a</a:t>
             </a:r>
             <a:r>
-              <a:rPr sz="1400" spc="-35" dirty="0">
-                <a:solidFill>
-                  <a:srgbClr val="1C1A1A"/>
-                </a:solidFill>
-                <a:latin typeface="Arial"/>
-                <a:cs typeface="Arial"/>
-              </a:rPr>
-              <a:t> </a:t>
-            </a:r>
-            <a:r>
-              <a:rPr sz="1400" dirty="0">
+              <a:rPr lang="en-US" sz="1400" spc="-35" dirty="0">
+                <a:solidFill>
+                  <a:srgbClr val="1C1A1A"/>
+                </a:solidFill>
+                <a:latin typeface="Arial"/>
+                <a:cs typeface="Arial"/>
+              </a:rPr>
+              <a:t> </a:t>
+            </a:r>
+            <a:r>
+              <a:rPr lang="en-US" sz="1400" dirty="0">
                 <a:solidFill>
                   <a:srgbClr val="1C1A1A"/>
                 </a:solidFill>
@@ -22887,17 +22957,17 @@
               <a:t>personalized</a:t>
             </a:r>
             <a:r>
-              <a:rPr sz="1400" spc="125" dirty="0">
-                <a:solidFill>
-                  <a:srgbClr val="1C1A1A"/>
-                </a:solidFill>
-                <a:latin typeface="Arial"/>
-                <a:cs typeface="Arial"/>
-              </a:rPr>
-              <a:t> </a:t>
-            </a:r>
-            <a:r>
-              <a:rPr sz="1400" spc="10" dirty="0">
+              <a:rPr lang="en-US" sz="1400" spc="125" dirty="0">
+                <a:solidFill>
+                  <a:srgbClr val="1C1A1A"/>
+                </a:solidFill>
+                <a:latin typeface="Arial"/>
+                <a:cs typeface="Arial"/>
+              </a:rPr>
+              <a:t> </a:t>
+            </a:r>
+            <a:r>
+              <a:rPr lang="en-US" sz="1400" spc="10" dirty="0">
                 <a:solidFill>
                   <a:srgbClr val="1C1A1A"/>
                 </a:solidFill>
@@ -22907,17 +22977,17 @@
               <a:t>model</a:t>
             </a:r>
             <a:r>
-              <a:rPr sz="1400" spc="-40" dirty="0">
-                <a:solidFill>
-                  <a:srgbClr val="1C1A1A"/>
-                </a:solidFill>
-                <a:latin typeface="Arial"/>
-                <a:cs typeface="Arial"/>
-              </a:rPr>
-              <a:t> </a:t>
-            </a:r>
-            <a:r>
-              <a:rPr sz="1400" spc="20" dirty="0">
+              <a:rPr lang="en-US" sz="1400" spc="-40" dirty="0">
+                <a:solidFill>
+                  <a:srgbClr val="1C1A1A"/>
+                </a:solidFill>
+                <a:latin typeface="Arial"/>
+                <a:cs typeface="Arial"/>
+              </a:rPr>
+              <a:t> </a:t>
+            </a:r>
+            <a:r>
+              <a:rPr lang="en-US" sz="1400" spc="20" dirty="0">
                 <a:solidFill>
                   <a:srgbClr val="1C1A1A"/>
                 </a:solidFill>
@@ -22927,17 +22997,17 @@
               <a:t>that</a:t>
             </a:r>
             <a:r>
-              <a:rPr sz="1400" spc="85" dirty="0">
-                <a:solidFill>
-                  <a:srgbClr val="1C1A1A"/>
-                </a:solidFill>
-                <a:latin typeface="Arial"/>
-                <a:cs typeface="Arial"/>
-              </a:rPr>
-              <a:t> </a:t>
-            </a:r>
-            <a:r>
-              <a:rPr sz="1400" spc="5" dirty="0">
+              <a:rPr lang="en-US" sz="1400" spc="85" dirty="0">
+                <a:solidFill>
+                  <a:srgbClr val="1C1A1A"/>
+                </a:solidFill>
+                <a:latin typeface="Arial"/>
+                <a:cs typeface="Arial"/>
+              </a:rPr>
+              <a:t> </a:t>
+            </a:r>
+            <a:r>
+              <a:rPr lang="en-US" sz="1400" spc="5" dirty="0">
                 <a:solidFill>
                   <a:srgbClr val="1C1A1A"/>
                 </a:solidFill>
@@ -22947,17 +23017,17 @@
               <a:t>improves</a:t>
             </a:r>
             <a:r>
-              <a:rPr sz="1400" spc="10" dirty="0">
-                <a:solidFill>
-                  <a:srgbClr val="1C1A1A"/>
-                </a:solidFill>
-                <a:latin typeface="Arial"/>
-                <a:cs typeface="Arial"/>
-              </a:rPr>
-              <a:t> </a:t>
-            </a:r>
-            <a:r>
-              <a:rPr sz="1400" spc="-10" dirty="0">
+              <a:rPr lang="en-US" sz="1400" spc="10" dirty="0">
+                <a:solidFill>
+                  <a:srgbClr val="1C1A1A"/>
+                </a:solidFill>
+                <a:latin typeface="Arial"/>
+                <a:cs typeface="Arial"/>
+              </a:rPr>
+              <a:t> </a:t>
+            </a:r>
+            <a:r>
+              <a:rPr lang="en-US" sz="1400" spc="-10" dirty="0">
                 <a:solidFill>
                   <a:srgbClr val="1C1A1A"/>
                 </a:solidFill>
@@ -22967,17 +23037,17 @@
               <a:t>over</a:t>
             </a:r>
             <a:r>
-              <a:rPr sz="1400" spc="60" dirty="0">
-                <a:solidFill>
-                  <a:srgbClr val="1C1A1A"/>
-                </a:solidFill>
-                <a:latin typeface="Arial"/>
-                <a:cs typeface="Arial"/>
-              </a:rPr>
-              <a:t> </a:t>
-            </a:r>
-            <a:r>
-              <a:rPr sz="1400" spc="10" dirty="0">
+              <a:rPr lang="en-US" sz="1400" spc="60" dirty="0">
+                <a:solidFill>
+                  <a:srgbClr val="1C1A1A"/>
+                </a:solidFill>
+                <a:latin typeface="Arial"/>
+                <a:cs typeface="Arial"/>
+              </a:rPr>
+              <a:t> </a:t>
+            </a:r>
+            <a:r>
+              <a:rPr lang="en-US" sz="1400" spc="10" dirty="0">
                 <a:solidFill>
                   <a:srgbClr val="1C1A1A"/>
                 </a:solidFill>
@@ -22987,17 +23057,17 @@
               <a:t>time</a:t>
             </a:r>
             <a:r>
-              <a:rPr sz="1400" spc="-5" dirty="0">
-                <a:solidFill>
-                  <a:srgbClr val="1C1A1A"/>
-                </a:solidFill>
-                <a:latin typeface="Arial"/>
-                <a:cs typeface="Arial"/>
-              </a:rPr>
-              <a:t> </a:t>
-            </a:r>
-            <a:r>
-              <a:rPr sz="1400" spc="15" dirty="0">
+              <a:rPr lang="en-US" sz="1400" spc="-5" dirty="0">
+                <a:solidFill>
+                  <a:srgbClr val="1C1A1A"/>
+                </a:solidFill>
+                <a:latin typeface="Arial"/>
+                <a:cs typeface="Arial"/>
+              </a:rPr>
+              <a:t> </a:t>
+            </a:r>
+            <a:r>
+              <a:rPr lang="en-US" sz="1400" spc="15" dirty="0">
                 <a:solidFill>
                   <a:srgbClr val="1C1A1A"/>
                 </a:solidFill>
@@ -23007,17 +23077,17 @@
               <a:t>without</a:t>
             </a:r>
             <a:r>
-              <a:rPr sz="1400" spc="120" dirty="0">
-                <a:solidFill>
-                  <a:srgbClr val="1C1A1A"/>
-                </a:solidFill>
-                <a:latin typeface="Arial"/>
-                <a:cs typeface="Arial"/>
-              </a:rPr>
-              <a:t> </a:t>
-            </a:r>
-            <a:r>
-              <a:rPr sz="1400" spc="5" dirty="0">
+              <a:rPr lang="en-US" sz="1400" spc="120" dirty="0">
+                <a:solidFill>
+                  <a:srgbClr val="1C1A1A"/>
+                </a:solidFill>
+                <a:latin typeface="Arial"/>
+                <a:cs typeface="Arial"/>
+              </a:rPr>
+              <a:t> </a:t>
+            </a:r>
+            <a:r>
+              <a:rPr lang="en-US" sz="1400" spc="5" dirty="0">
                 <a:solidFill>
                   <a:srgbClr val="1C1A1A"/>
                 </a:solidFill>
@@ -23027,17 +23097,17 @@
               <a:t>sharing</a:t>
             </a:r>
             <a:r>
-              <a:rPr sz="1400" spc="35" dirty="0">
-                <a:solidFill>
-                  <a:srgbClr val="1C1A1A"/>
-                </a:solidFill>
-                <a:latin typeface="Arial"/>
-                <a:cs typeface="Arial"/>
-              </a:rPr>
-              <a:t> </a:t>
-            </a:r>
-            <a:r>
-              <a:rPr sz="1400" spc="5" dirty="0">
+              <a:rPr lang="en-US" sz="1400" spc="35" dirty="0">
+                <a:solidFill>
+                  <a:srgbClr val="1C1A1A"/>
+                </a:solidFill>
+                <a:latin typeface="Arial"/>
+                <a:cs typeface="Arial"/>
+              </a:rPr>
+              <a:t> </a:t>
+            </a:r>
+            <a:r>
+              <a:rPr lang="en-US" sz="1400" spc="5" dirty="0">
                 <a:solidFill>
                   <a:srgbClr val="1C1A1A"/>
                 </a:solidFill>
@@ -23046,7 +23116,7 @@
               </a:rPr>
               <a:t>data.</a:t>
             </a:r>
-            <a:endParaRPr sz="1400" dirty="0">
+            <a:endParaRPr lang="en-US" sz="1400" dirty="0">
               <a:latin typeface="Arial"/>
               <a:cs typeface="Arial"/>
             </a:endParaRPr>
@@ -23069,46 +23139,6 @@
               </a:tabLst>
             </a:pPr>
             <a:r>
-              <a:rPr sz="1400" b="1" spc="-10" dirty="0">
-                <a:solidFill>
-                  <a:srgbClr val="1C1A1A"/>
-                </a:solidFill>
-                <a:latin typeface="Arial"/>
-                <a:cs typeface="Arial"/>
-              </a:rPr>
-              <a:t>Phase</a:t>
-            </a:r>
-            <a:r>
-              <a:rPr sz="1400" b="1" spc="-25" dirty="0">
-                <a:solidFill>
-                  <a:srgbClr val="1C1A1A"/>
-                </a:solidFill>
-                <a:latin typeface="Arial"/>
-                <a:cs typeface="Arial"/>
-              </a:rPr>
-              <a:t> </a:t>
-            </a:r>
-            <a:r>
-              <a:rPr sz="1400" b="1" spc="-5" dirty="0">
-                <a:solidFill>
-                  <a:srgbClr val="1C1A1A"/>
-                </a:solidFill>
-                <a:latin typeface="Arial"/>
-                <a:cs typeface="Arial"/>
-              </a:rPr>
-              <a:t>3:</a:t>
-            </a:r>
-            <a:r>
-              <a:rPr sz="1400" b="1" spc="-20" dirty="0">
-                <a:solidFill>
-                  <a:srgbClr val="1C1A1A"/>
-                </a:solidFill>
-                <a:latin typeface="Arial"/>
-                <a:cs typeface="Arial"/>
-              </a:rPr>
-              <a:t> </a:t>
-            </a:r>
-            <a:r>
               <a:rPr sz="1400" b="1" spc="10" dirty="0">
                 <a:solidFill>
                   <a:srgbClr val="1C1A1A"/>
@@ -23504,6 +23534,218 @@
 </file>
 
 <file path=ppt/slides/slide8.xml><?xml version="1.0" encoding="utf-8"?>
+<p:sld xmlns:a="http://schemas.openxmlformats.org/drawingml/2006/main" xmlns:r="http://schemas.openxmlformats.org/officeDocument/2006/relationships" xmlns:p="http://schemas.openxmlformats.org/presentationml/2006/main">
+  <p:cSld>
+    <p:spTree>
+      <p:nvGrpSpPr>
+        <p:cNvPr id="1" name="">
+          <a:extLst>
+            <a:ext uri="{FF2B5EF4-FFF2-40B4-BE49-F238E27FC236}">
+              <a16:creationId xmlns:a16="http://schemas.microsoft.com/office/drawing/2014/main" id="{A9F7FD19-7AB2-55D6-333B-E1C7BE091FBD}"/>
+            </a:ext>
+          </a:extLst>
+        </p:cNvPr>
+        <p:cNvGrpSpPr/>
+        <p:nvPr/>
+      </p:nvGrpSpPr>
+      <p:grpSpPr>
+        <a:xfrm>
+          <a:off x="0" y="0"/>
+          <a:ext cx="0" cy="0"/>
+          <a:chOff x="0" y="0"/>
+          <a:chExt cx="0" cy="0"/>
+        </a:xfrm>
+      </p:grpSpPr>
+      <p:sp>
+        <p:nvSpPr>
+          <p:cNvPr id="2" name="object 2">
+            <a:extLst>
+              <a:ext uri="{FF2B5EF4-FFF2-40B4-BE49-F238E27FC236}">
+                <a16:creationId xmlns:a16="http://schemas.microsoft.com/office/drawing/2014/main" id="{7A8349CF-DE4E-B6FE-DB09-B9D0EA7F6BFF}"/>
+              </a:ext>
+            </a:extLst>
+          </p:cNvPr>
+          <p:cNvSpPr txBox="1"/>
+          <p:nvPr/>
+        </p:nvSpPr>
+        <p:spPr>
+          <a:xfrm>
+            <a:off x="531812" y="685801"/>
+            <a:ext cx="10744200" cy="5447645"/>
+          </a:xfrm>
+          <a:prstGeom prst="rect">
+            <a:avLst/>
+          </a:prstGeom>
+        </p:spPr>
+        <p:txBody>
+          <a:bodyPr vert="horz" wrap="square" lIns="0" tIns="0" rIns="0" bIns="0" rtlCol="0">
+            <a:spAutoFit/>
+          </a:bodyPr>
+          <a:lstStyle/>
+          <a:p>
+            <a:pPr marL="12700">
+              <a:lnSpc>
+                <a:spcPct val="100000"/>
+              </a:lnSpc>
+            </a:pPr>
+            <a:r>
+              <a:rPr lang="en-US" sz="3200" b="1" spc="55" dirty="0">
+                <a:solidFill>
+                  <a:srgbClr val="1C1A1A"/>
+                </a:solidFill>
+                <a:latin typeface="Arial"/>
+                <a:cs typeface="Arial"/>
+              </a:rPr>
+              <a:t>Improvements in PBL 2</a:t>
+            </a:r>
+          </a:p>
+          <a:p>
+            <a:pPr marL="12700">
+              <a:lnSpc>
+                <a:spcPct val="100000"/>
+              </a:lnSpc>
+            </a:pPr>
+            <a:endParaRPr lang="en-US" sz="3200" b="1" spc="55" dirty="0">
+              <a:solidFill>
+                <a:srgbClr val="1C1A1A"/>
+              </a:solidFill>
+              <a:latin typeface="Arial"/>
+              <a:cs typeface="Arial"/>
+            </a:endParaRPr>
+          </a:p>
+          <a:p>
+            <a:r>
+              <a:rPr lang="en-US" b="1" dirty="0"/>
+              <a:t>Categorization using a ML model</a:t>
+            </a:r>
+            <a:r>
+              <a:rPr lang="en-US" dirty="0"/>
+              <a:t>: Uses an NLP Machine Learning model (scikit-learn) to intelligently categorize transactions based on description.</a:t>
+            </a:r>
+          </a:p>
+          <a:p>
+            <a:endParaRPr lang="en-US" dirty="0"/>
+          </a:p>
+          <a:p>
+            <a:r>
+              <a:rPr lang="en-US" b="1" dirty="0"/>
+              <a:t>Robust Fallback Logic</a:t>
+            </a:r>
+            <a:r>
+              <a:rPr lang="en-US" dirty="0"/>
+              <a:t>: Automatically falls back to keyword-matching if the ML model is not available.</a:t>
+            </a:r>
+          </a:p>
+          <a:p>
+            <a:endParaRPr lang="en-US" dirty="0"/>
+          </a:p>
+          <a:p>
+            <a:r>
+              <a:rPr lang="en-US" b="1" dirty="0"/>
+              <a:t>Data Generation</a:t>
+            </a:r>
+            <a:r>
+              <a:rPr lang="en-US" dirty="0"/>
+              <a:t>: Includes a script (generate_large_csv.py) that uses Faker to generate synthetic transaction data for testing.</a:t>
+            </a:r>
+          </a:p>
+          <a:p>
+            <a:endParaRPr lang="en-US" dirty="0"/>
+          </a:p>
+          <a:p>
+            <a:r>
+              <a:rPr lang="en-US" b="1" dirty="0"/>
+              <a:t>Smart Data Cleaning</a:t>
+            </a:r>
+            <a:r>
+              <a:rPr lang="en-US" dirty="0"/>
+              <a:t>: Handles various currency formats, extracts negative/positive balances correctly, and tracks Income vs. Expenses.</a:t>
+            </a:r>
+          </a:p>
+          <a:p>
+            <a:endParaRPr lang="en-US" dirty="0"/>
+          </a:p>
+          <a:p>
+            <a:r>
+              <a:rPr lang="en-US" b="1" dirty="0"/>
+              <a:t>Visual Excel Reporting</a:t>
+            </a:r>
+            <a:r>
+              <a:rPr lang="en-US" dirty="0"/>
+              <a:t>: Generates a beautiful Excel workbook using </a:t>
+            </a:r>
+            <a:r>
+              <a:rPr lang="en-US" dirty="0" err="1"/>
+              <a:t>openpyxl</a:t>
+            </a:r>
+            <a:r>
+              <a:rPr lang="en-US" dirty="0"/>
+              <a:t> with:</a:t>
+            </a:r>
+          </a:p>
+          <a:p>
+            <a:pPr lvl="1"/>
+            <a:r>
+              <a:rPr lang="en-US" b="1" dirty="0"/>
+              <a:t>Transactions Sheet</a:t>
+            </a:r>
+            <a:r>
+              <a:rPr lang="en-US" dirty="0"/>
+              <a:t>: Cleaned raw data, color-coded for income (green) and expenses (red).</a:t>
+            </a:r>
+          </a:p>
+          <a:p>
+            <a:pPr lvl="1"/>
+            <a:r>
+              <a:rPr lang="en-US" b="1" dirty="0"/>
+              <a:t>Summary Sheet</a:t>
+            </a:r>
+            <a:r>
+              <a:rPr lang="en-US" dirty="0"/>
+              <a:t>: Financial overview and aggregated spending.</a:t>
+            </a:r>
+          </a:p>
+          <a:p>
+            <a:pPr lvl="1"/>
+            <a:r>
+              <a:rPr lang="en-US" b="1" dirty="0"/>
+              <a:t>Visualization</a:t>
+            </a:r>
+            <a:r>
+              <a:rPr lang="en-US" dirty="0"/>
+              <a:t>: A built-in Pie Chart showing spending distribution based on categories.</a:t>
+            </a:r>
+          </a:p>
+          <a:p>
+            <a:pPr marL="12700">
+              <a:lnSpc>
+                <a:spcPct val="100000"/>
+              </a:lnSpc>
+            </a:pPr>
+            <a:endParaRPr lang="en-US" sz="2000" b="1" spc="55" dirty="0">
+              <a:solidFill>
+                <a:srgbClr val="1C1A1A"/>
+              </a:solidFill>
+              <a:latin typeface="Arial"/>
+              <a:cs typeface="Arial"/>
+            </a:endParaRPr>
+          </a:p>
+        </p:txBody>
+      </p:sp>
+    </p:spTree>
+    <p:extLst>
+      <p:ext uri="{BB962C8B-B14F-4D97-AF65-F5344CB8AC3E}">
+        <p14:creationId xmlns:p14="http://schemas.microsoft.com/office/powerpoint/2010/main" val="3585509390"/>
+      </p:ext>
+    </p:extLst>
+  </p:cSld>
+  <p:clrMapOvr>
+    <a:masterClrMapping/>
+  </p:clrMapOvr>
+</p:sld>
+</file>
+
+<file path=ppt/slides/slide9.xml><?xml version="1.0" encoding="utf-8"?>
 <p:sld xmlns:a="http://schemas.openxmlformats.org/drawingml/2006/main" xmlns:r="http://schemas.openxmlformats.org/officeDocument/2006/relationships" xmlns:p="http://schemas.openxmlformats.org/presentationml/2006/main" showMasterSp="0">
   <p:cSld>
     <p:spTree>
@@ -23601,72 +23843,6 @@
         </p:txBody>
       </p:sp>
     </p:spTree>
-  </p:cSld>
-  <p:clrMapOvr>
-    <a:masterClrMapping/>
-  </p:clrMapOvr>
-</p:sld>
-</file>
-
-<file path=ppt/slides/slide9.xml><?xml version="1.0" encoding="utf-8"?>
-<p:sld xmlns:a="http://schemas.openxmlformats.org/drawingml/2006/main" xmlns:r="http://schemas.openxmlformats.org/officeDocument/2006/relationships" xmlns:p="http://schemas.openxmlformats.org/presentationml/2006/main">
-  <p:cSld>
-    <p:spTree>
-      <p:nvGrpSpPr>
-        <p:cNvPr id="1" name=""/>
-        <p:cNvGrpSpPr/>
-        <p:nvPr/>
-      </p:nvGrpSpPr>
-      <p:grpSpPr>
-        <a:xfrm>
-          <a:off x="0" y="0"/>
-          <a:ext cx="0" cy="0"/>
-          <a:chOff x="0" y="0"/>
-          <a:chExt cx="0" cy="0"/>
-        </a:xfrm>
-      </p:grpSpPr>
-      <p:pic>
-        <p:nvPicPr>
-          <p:cNvPr id="3" name="Picture 2" descr="A screen shot of a computer&#10;&#10;AI-generated content may be incorrect.">
-            <a:extLst>
-              <a:ext uri="{FF2B5EF4-FFF2-40B4-BE49-F238E27FC236}">
-                <a16:creationId xmlns:a16="http://schemas.microsoft.com/office/drawing/2014/main" id="{A34A5C96-B8CB-9ED5-7FF6-F5577A1E8F99}"/>
-              </a:ext>
-            </a:extLst>
-          </p:cNvPr>
-          <p:cNvPicPr>
-            <a:picLocks noChangeAspect="1"/>
-          </p:cNvPicPr>
-          <p:nvPr/>
-        </p:nvPicPr>
-        <p:blipFill>
-          <a:blip r:embed="rId2">
-            <a:extLst>
-              <a:ext uri="{28A0092B-C50C-407E-A947-70E740481C1C}">
-                <a14:useLocalDpi xmlns:a14="http://schemas.microsoft.com/office/drawing/2010/main" val="0"/>
-              </a:ext>
-            </a:extLst>
-          </a:blip>
-          <a:stretch>
-            <a:fillRect/>
-          </a:stretch>
-        </p:blipFill>
-        <p:spPr>
-          <a:xfrm>
-            <a:off x="0" y="893"/>
-            <a:ext cx="12188825" cy="6856214"/>
-          </a:xfrm>
-          <a:prstGeom prst="rect">
-            <a:avLst/>
-          </a:prstGeom>
-        </p:spPr>
-      </p:pic>
-    </p:spTree>
-    <p:extLst>
-      <p:ext uri="{BB962C8B-B14F-4D97-AF65-F5344CB8AC3E}">
-        <p14:creationId xmlns:p14="http://schemas.microsoft.com/office/powerpoint/2010/main" val="1244062432"/>
-      </p:ext>
-    </p:extLst>
   </p:cSld>
   <p:clrMapOvr>
     <a:masterClrMapping/>

</xml_diff>